<commit_message>
Passing values from one component to another
</commit_message>
<xml_diff>
--- a/Angular.pptx
+++ b/Angular.pptx
@@ -10,7 +10,8 @@
     <p:sldId id="270" r:id="rId4"/>
     <p:sldId id="271" r:id="rId5"/>
     <p:sldId id="272" r:id="rId6"/>
-    <p:sldId id="269" r:id="rId7"/>
+    <p:sldId id="273" r:id="rId7"/>
+    <p:sldId id="269" r:id="rId8"/>
   </p:sldIdLst>
   <p:sldSz cx="9144000" cy="6858000" type="screen4x3"/>
   <p:notesSz cx="6858000" cy="9144000"/>
@@ -300,7 +301,7 @@
           <a:p>
             <a:fld id="{8F235549-BF0A-4B98-8561-3786244E808C}" type="datetimeFigureOut">
               <a:rPr lang="en-US" smtClean="0"/>
-              <a:t>2/12/2018</a:t>
+              <a:t>2/13/2018</a:t>
             </a:fld>
             <a:endParaRPr lang="en-US"/>
           </a:p>
@@ -500,7 +501,7 @@
           <a:p>
             <a:fld id="{8F235549-BF0A-4B98-8561-3786244E808C}" type="datetimeFigureOut">
               <a:rPr lang="en-US" smtClean="0"/>
-              <a:t>2/12/2018</a:t>
+              <a:t>2/13/2018</a:t>
             </a:fld>
             <a:endParaRPr lang="en-US"/>
           </a:p>
@@ -675,7 +676,7 @@
           <a:p>
             <a:fld id="{8F235549-BF0A-4B98-8561-3786244E808C}" type="datetimeFigureOut">
               <a:rPr lang="en-US" smtClean="0"/>
-              <a:t>2/12/2018</a:t>
+              <a:t>2/13/2018</a:t>
             </a:fld>
             <a:endParaRPr lang="en-US"/>
           </a:p>
@@ -840,7 +841,7 @@
           <a:p>
             <a:fld id="{8F235549-BF0A-4B98-8561-3786244E808C}" type="datetimeFigureOut">
               <a:rPr lang="en-US" smtClean="0"/>
-              <a:t>2/12/2018</a:t>
+              <a:t>2/13/2018</a:t>
             </a:fld>
             <a:endParaRPr lang="en-US"/>
           </a:p>
@@ -1088,7 +1089,7 @@
           <a:p>
             <a:fld id="{8F235549-BF0A-4B98-8561-3786244E808C}" type="datetimeFigureOut">
               <a:rPr lang="en-US" smtClean="0"/>
-              <a:t>2/12/2018</a:t>
+              <a:t>2/13/2018</a:t>
             </a:fld>
             <a:endParaRPr lang="en-US"/>
           </a:p>
@@ -1406,7 +1407,7 @@
           <a:p>
             <a:fld id="{8F235549-BF0A-4B98-8561-3786244E808C}" type="datetimeFigureOut">
               <a:rPr lang="en-US" smtClean="0"/>
-              <a:t>2/12/2018</a:t>
+              <a:t>2/13/2018</a:t>
             </a:fld>
             <a:endParaRPr lang="en-US"/>
           </a:p>
@@ -1872,7 +1873,7 @@
           <a:p>
             <a:fld id="{8F235549-BF0A-4B98-8561-3786244E808C}" type="datetimeFigureOut">
               <a:rPr lang="en-US" smtClean="0"/>
-              <a:t>2/12/2018</a:t>
+              <a:t>2/13/2018</a:t>
             </a:fld>
             <a:endParaRPr lang="en-US"/>
           </a:p>
@@ -2020,7 +2021,7 @@
           <a:p>
             <a:fld id="{8F235549-BF0A-4B98-8561-3786244E808C}" type="datetimeFigureOut">
               <a:rPr lang="en-US" smtClean="0"/>
-              <a:t>2/12/2018</a:t>
+              <a:t>2/13/2018</a:t>
             </a:fld>
             <a:endParaRPr lang="en-US"/>
           </a:p>
@@ -2110,7 +2111,7 @@
           <a:p>
             <a:fld id="{8F235549-BF0A-4B98-8561-3786244E808C}" type="datetimeFigureOut">
               <a:rPr lang="en-US" smtClean="0"/>
-              <a:t>2/12/2018</a:t>
+              <a:t>2/13/2018</a:t>
             </a:fld>
             <a:endParaRPr lang="en-US"/>
           </a:p>
@@ -2384,7 +2385,7 @@
           <a:p>
             <a:fld id="{8F235549-BF0A-4B98-8561-3786244E808C}" type="datetimeFigureOut">
               <a:rPr lang="en-US" smtClean="0"/>
-              <a:t>2/12/2018</a:t>
+              <a:t>2/13/2018</a:t>
             </a:fld>
             <a:endParaRPr lang="en-US"/>
           </a:p>
@@ -2689,7 +2690,7 @@
           <a:p>
             <a:fld id="{8F235549-BF0A-4B98-8561-3786244E808C}" type="datetimeFigureOut">
               <a:rPr lang="en-US" smtClean="0"/>
-              <a:t>2/12/2018</a:t>
+              <a:t>2/13/2018</a:t>
             </a:fld>
             <a:endParaRPr lang="en-US"/>
           </a:p>
@@ -2987,7 +2988,7 @@
           <a:p>
             <a:fld id="{8F235549-BF0A-4B98-8561-3786244E808C}" type="datetimeFigureOut">
               <a:rPr lang="en-US" smtClean="0"/>
-              <a:t>2/12/2018</a:t>
+              <a:t>2/13/2018</a:t>
             </a:fld>
             <a:endParaRPr lang="en-US"/>
           </a:p>
@@ -4235,11 +4236,7 @@
             </a:r>
             <a:r>
               <a:rPr lang="en-GB" sz="1600" dirty="0"/>
-              <a:t>, produce and consume RxJS </a:t>
-            </a:r>
-            <a:r>
-              <a:rPr lang="en-GB" sz="1600" dirty="0"/>
-              <a:t>Observables</a:t>
+              <a:t>, produce and consume RxJS Observables</a:t>
             </a:r>
             <a:r>
               <a:rPr lang="en-GB" sz="1600" dirty="0" smtClean="0"/>
@@ -4303,7 +4300,7 @@
           <a:p>
             <a:r>
               <a:rPr lang="en-US" dirty="0" smtClean="0"/>
-              <a:t>References</a:t>
+              <a:t>Passing values between components</a:t>
             </a:r>
             <a:endParaRPr lang="en-US" dirty="0"/>
           </a:p>
@@ -4327,8 +4324,236 @@
           <a:lstStyle/>
           <a:p>
             <a:r>
+              <a:rPr lang="en-GB" sz="1600" b="1" dirty="0" smtClean="0"/>
+              <a:t>Service </a:t>
+            </a:r>
+            <a:r>
+              <a:rPr lang="en-GB" sz="1600" dirty="0" smtClean="0"/>
+              <a:t>should be used to pass values from one component to another</a:t>
+            </a:r>
+          </a:p>
+          <a:p>
+            <a:r>
+              <a:rPr lang="en-GB" sz="1600" dirty="0" smtClean="0"/>
+              <a:t>Receiving component:-</a:t>
+            </a:r>
+          </a:p>
+          <a:p>
+            <a:pPr marL="0" indent="0">
+              <a:buNone/>
+            </a:pPr>
+            <a:r>
+              <a:rPr lang="en-GB" sz="1600" dirty="0" err="1"/>
+              <a:t>ngOnInit</a:t>
+            </a:r>
+            <a:r>
+              <a:rPr lang="en-GB" sz="1600" dirty="0"/>
+              <a:t>() { </a:t>
+            </a:r>
+            <a:endParaRPr lang="en-GB" sz="1600" dirty="0" smtClean="0"/>
+          </a:p>
+          <a:p>
+            <a:pPr marL="0" indent="0">
+              <a:buNone/>
+            </a:pPr>
+            <a:r>
+              <a:rPr lang="en-GB" sz="1600" dirty="0" smtClean="0"/>
+              <a:t>	</a:t>
+            </a:r>
+            <a:r>
+              <a:rPr lang="en-GB" sz="1600" dirty="0" err="1" smtClean="0"/>
+              <a:t>this.myService.currentMessage.subscribe</a:t>
+            </a:r>
+            <a:r>
+              <a:rPr lang="en-GB" sz="1600" dirty="0" smtClean="0"/>
+              <a:t>(message </a:t>
+            </a:r>
+            <a:r>
+              <a:rPr lang="en-GB" sz="1600" dirty="0"/>
+              <a:t>=&gt; </a:t>
+            </a:r>
+            <a:r>
+              <a:rPr lang="en-GB" sz="1600" dirty="0" err="1"/>
+              <a:t>this.message</a:t>
+            </a:r>
+            <a:r>
+              <a:rPr lang="en-GB" sz="1600" dirty="0"/>
+              <a:t> = message); </a:t>
+            </a:r>
+            <a:endParaRPr lang="en-GB" sz="1600" dirty="0" smtClean="0"/>
+          </a:p>
+          <a:p>
+            <a:pPr marL="0" indent="0">
+              <a:buNone/>
+            </a:pPr>
+            <a:r>
+              <a:rPr lang="en-GB" sz="1600" dirty="0" smtClean="0"/>
+              <a:t>}</a:t>
+            </a:r>
+          </a:p>
+          <a:p>
+            <a:r>
+              <a:rPr lang="en-GB" sz="1600" dirty="0" smtClean="0"/>
+              <a:t>Sending component:-</a:t>
+            </a:r>
+          </a:p>
+          <a:p>
+            <a:pPr marL="0" indent="0">
+              <a:buNone/>
+            </a:pPr>
+            <a:r>
+              <a:rPr lang="en-GB" sz="1600" dirty="0" err="1"/>
+              <a:t>sendMessage</a:t>
+            </a:r>
+            <a:r>
+              <a:rPr lang="en-GB" sz="1600" dirty="0"/>
+              <a:t>(message: </a:t>
+            </a:r>
+            <a:r>
+              <a:rPr lang="en-GB" sz="1600" dirty="0" err="1"/>
+              <a:t>type_of_the_message</a:t>
+            </a:r>
+            <a:r>
+              <a:rPr lang="en-GB" sz="1600" dirty="0"/>
+              <a:t>) { </a:t>
+            </a:r>
+            <a:endParaRPr lang="en-GB" sz="1600" dirty="0" smtClean="0"/>
+          </a:p>
+          <a:p>
+            <a:pPr marL="0" indent="0">
+              <a:buNone/>
+            </a:pPr>
+            <a:r>
+              <a:rPr lang="en-GB" sz="1600" dirty="0"/>
+              <a:t>	</a:t>
+            </a:r>
+            <a:r>
+              <a:rPr lang="en-GB" sz="1600" dirty="0" err="1" smtClean="0"/>
+              <a:t>this.messageSource.next</a:t>
+            </a:r>
+            <a:r>
+              <a:rPr lang="en-GB" sz="1600" dirty="0" smtClean="0"/>
+              <a:t>(message</a:t>
+            </a:r>
+            <a:r>
+              <a:rPr lang="en-GB" sz="1600" dirty="0"/>
+              <a:t>); </a:t>
+            </a:r>
+            <a:endParaRPr lang="en-GB" sz="1600" dirty="0" smtClean="0"/>
+          </a:p>
+          <a:p>
+            <a:pPr marL="0" indent="0">
+              <a:buNone/>
+            </a:pPr>
+            <a:r>
+              <a:rPr lang="en-GB" sz="1600" dirty="0" smtClean="0"/>
+              <a:t>}</a:t>
+            </a:r>
+            <a:endParaRPr lang="en-GB" sz="1600" dirty="0"/>
+          </a:p>
+          <a:p>
+            <a:pPr marL="0" indent="0">
+              <a:buNone/>
+            </a:pPr>
+            <a:endParaRPr lang="en-GB" sz="1600" dirty="0"/>
+          </a:p>
+        </p:txBody>
+      </p:sp>
+    </p:spTree>
+    <p:extLst>
+      <p:ext uri="{BB962C8B-B14F-4D97-AF65-F5344CB8AC3E}">
+        <p14:creationId xmlns:p14="http://schemas.microsoft.com/office/powerpoint/2010/main" val="2441013828"/>
+      </p:ext>
+    </p:extLst>
+  </p:cSld>
+  <p:clrMapOvr>
+    <a:masterClrMapping/>
+  </p:clrMapOvr>
+  <p:timing>
+    <p:tnLst>
+      <p:par>
+        <p:cTn id="1" dur="indefinite" restart="never" nodeType="tmRoot"/>
+      </p:par>
+    </p:tnLst>
+  </p:timing>
+</p:sld>
+</file>
+
+<file path=ppt/slides/slide7.xml><?xml version="1.0" encoding="utf-8"?>
+<p:sld xmlns:a="http://schemas.openxmlformats.org/drawingml/2006/main" xmlns:r="http://schemas.openxmlformats.org/officeDocument/2006/relationships" xmlns:p="http://schemas.openxmlformats.org/presentationml/2006/main">
+  <p:cSld>
+    <p:spTree>
+      <p:nvGrpSpPr>
+        <p:cNvPr id="1" name=""/>
+        <p:cNvGrpSpPr/>
+        <p:nvPr/>
+      </p:nvGrpSpPr>
+      <p:grpSpPr>
+        <a:xfrm>
+          <a:off x="0" y="0"/>
+          <a:ext cx="0" cy="0"/>
+          <a:chOff x="0" y="0"/>
+          <a:chExt cx="0" cy="0"/>
+        </a:xfrm>
+      </p:grpSpPr>
+      <p:sp>
+        <p:nvSpPr>
+          <p:cNvPr id="2" name="Title 1"/>
+          <p:cNvSpPr>
+            <a:spLocks noGrp="1"/>
+          </p:cNvSpPr>
+          <p:nvPr>
+            <p:ph type="title"/>
+          </p:nvPr>
+        </p:nvSpPr>
+        <p:spPr/>
+        <p:txBody>
+          <a:bodyPr/>
+          <a:lstStyle/>
+          <a:p>
+            <a:r>
+              <a:rPr lang="en-US" dirty="0" smtClean="0"/>
+              <a:t>References</a:t>
+            </a:r>
+            <a:endParaRPr lang="en-US" dirty="0"/>
+          </a:p>
+        </p:txBody>
+      </p:sp>
+      <p:sp>
+        <p:nvSpPr>
+          <p:cNvPr id="3" name="Content Placeholder 2"/>
+          <p:cNvSpPr>
+            <a:spLocks noGrp="1"/>
+          </p:cNvSpPr>
+          <p:nvPr>
+            <p:ph idx="1"/>
+          </p:nvPr>
+        </p:nvSpPr>
+        <p:spPr/>
+        <p:txBody>
+          <a:bodyPr>
+            <a:normAutofit/>
+          </a:bodyPr>
+          <a:lstStyle/>
+          <a:p>
+            <a:r>
+              <a:rPr lang="en-US" sz="1600" dirty="0">
+                <a:hlinkClick r:id="rId2"/>
+              </a:rPr>
+              <a:t>https://</a:t>
+            </a:r>
+            <a:r>
+              <a:rPr lang="en-US" sz="1600" dirty="0" smtClean="0">
+                <a:hlinkClick r:id="rId2"/>
+              </a:rPr>
+              <a:t>angular.io/guide/upgrade</a:t>
+            </a:r>
+            <a:endParaRPr lang="en-US" sz="1600" dirty="0" smtClean="0"/>
+          </a:p>
+          <a:p>
+            <a:r>
               <a:rPr lang="en-US" sz="1600" dirty="0"/>
-              <a:t>https://angular.io/guide/upgrade</a:t>
+              <a:t>https://stackoverflow.com/questions/48763221/angular-pass-parameter-to-another-component</a:t>
             </a:r>
             <a:endParaRPr lang="en-US" sz="1600" dirty="0" smtClean="0"/>
           </a:p>

</xml_diff>